<commit_message>
Rename labs, add updated slides so far
</commit_message>
<xml_diff>
--- a/slides/0x100/0x100 – Introduction to the Introduction.pptx
+++ b/slides/0x100/0x100 – Introduction to the Introduction.pptx
@@ -9,8 +9,8 @@
     <p:sldId id="257" r:id="rId3"/>
     <p:sldId id="258" r:id="rId4"/>
     <p:sldId id="267" r:id="rId5"/>
-    <p:sldId id="259" r:id="rId6"/>
-    <p:sldId id="260" r:id="rId7"/>
+    <p:sldId id="268" r:id="rId6"/>
+    <p:sldId id="259" r:id="rId7"/>
     <p:sldId id="261" r:id="rId8"/>
     <p:sldId id="262" r:id="rId9"/>
     <p:sldId id="263" r:id="rId10"/>
@@ -115,6 +115,11 @@
       </a:defRPr>
     </a:lvl9pPr>
   </p:defaultTextStyle>
+  <p:extLst>
+    <p:ext uri="{EFAFB233-063F-42B5-8137-9DF3F51BA10A}">
+      <p15:sldGuideLst xmlns:p15="http://schemas.microsoft.com/office/powerpoint/2012/main"/>
+    </p:ext>
+  </p:extLst>
 </p:presentation>
 </file>
 
@@ -267,7 +272,7 @@
           <a:p>
             <a:fld id="{76485C7A-D989-467D-AF24-38697A6F93C0}" type="datetimeFigureOut">
               <a:rPr lang="en-CA" smtClean="0"/>
-              <a:t>2020-09-07</a:t>
+              <a:t>2023-09-06</a:t>
             </a:fld>
             <a:endParaRPr lang="en-CA"/>
           </a:p>
@@ -467,7 +472,7 @@
           <a:p>
             <a:fld id="{76485C7A-D989-467D-AF24-38697A6F93C0}" type="datetimeFigureOut">
               <a:rPr lang="en-CA" smtClean="0"/>
-              <a:t>2020-09-07</a:t>
+              <a:t>2023-09-06</a:t>
             </a:fld>
             <a:endParaRPr lang="en-CA"/>
           </a:p>
@@ -677,7 +682,7 @@
           <a:p>
             <a:fld id="{76485C7A-D989-467D-AF24-38697A6F93C0}" type="datetimeFigureOut">
               <a:rPr lang="en-CA" smtClean="0"/>
-              <a:t>2020-09-07</a:t>
+              <a:t>2023-09-06</a:t>
             </a:fld>
             <a:endParaRPr lang="en-CA"/>
           </a:p>
@@ -877,7 +882,7 @@
           <a:p>
             <a:fld id="{76485C7A-D989-467D-AF24-38697A6F93C0}" type="datetimeFigureOut">
               <a:rPr lang="en-CA" smtClean="0"/>
-              <a:t>2020-09-07</a:t>
+              <a:t>2023-09-06</a:t>
             </a:fld>
             <a:endParaRPr lang="en-CA"/>
           </a:p>
@@ -1153,7 +1158,7 @@
           <a:p>
             <a:fld id="{76485C7A-D989-467D-AF24-38697A6F93C0}" type="datetimeFigureOut">
               <a:rPr lang="en-CA" smtClean="0"/>
-              <a:t>2020-09-07</a:t>
+              <a:t>2023-09-06</a:t>
             </a:fld>
             <a:endParaRPr lang="en-CA"/>
           </a:p>
@@ -1421,7 +1426,7 @@
           <a:p>
             <a:fld id="{76485C7A-D989-467D-AF24-38697A6F93C0}" type="datetimeFigureOut">
               <a:rPr lang="en-CA" smtClean="0"/>
-              <a:t>2020-09-07</a:t>
+              <a:t>2023-09-06</a:t>
             </a:fld>
             <a:endParaRPr lang="en-CA"/>
           </a:p>
@@ -1836,7 +1841,7 @@
           <a:p>
             <a:fld id="{76485C7A-D989-467D-AF24-38697A6F93C0}" type="datetimeFigureOut">
               <a:rPr lang="en-CA" smtClean="0"/>
-              <a:t>2020-09-07</a:t>
+              <a:t>2023-09-06</a:t>
             </a:fld>
             <a:endParaRPr lang="en-CA"/>
           </a:p>
@@ -1978,7 +1983,7 @@
           <a:p>
             <a:fld id="{76485C7A-D989-467D-AF24-38697A6F93C0}" type="datetimeFigureOut">
               <a:rPr lang="en-CA" smtClean="0"/>
-              <a:t>2020-09-07</a:t>
+              <a:t>2023-09-06</a:t>
             </a:fld>
             <a:endParaRPr lang="en-CA"/>
           </a:p>
@@ -2091,7 +2096,7 @@
           <a:p>
             <a:fld id="{76485C7A-D989-467D-AF24-38697A6F93C0}" type="datetimeFigureOut">
               <a:rPr lang="en-CA" smtClean="0"/>
-              <a:t>2020-09-07</a:t>
+              <a:t>2023-09-06</a:t>
             </a:fld>
             <a:endParaRPr lang="en-CA"/>
           </a:p>
@@ -2404,7 +2409,7 @@
           <a:p>
             <a:fld id="{76485C7A-D989-467D-AF24-38697A6F93C0}" type="datetimeFigureOut">
               <a:rPr lang="en-CA" smtClean="0"/>
-              <a:t>2020-09-07</a:t>
+              <a:t>2023-09-06</a:t>
             </a:fld>
             <a:endParaRPr lang="en-CA"/>
           </a:p>
@@ -2693,7 +2698,7 @@
           <a:p>
             <a:fld id="{76485C7A-D989-467D-AF24-38697A6F93C0}" type="datetimeFigureOut">
               <a:rPr lang="en-CA" smtClean="0"/>
-              <a:t>2020-09-07</a:t>
+              <a:t>2023-09-06</a:t>
             </a:fld>
             <a:endParaRPr lang="en-CA"/>
           </a:p>
@@ -2936,7 +2941,7 @@
           <a:p>
             <a:fld id="{76485C7A-D989-467D-AF24-38697A6F93C0}" type="datetimeFigureOut">
               <a:rPr lang="en-CA" smtClean="0"/>
-              <a:t>2020-09-07</a:t>
+              <a:t>2023-09-06</a:t>
             </a:fld>
             <a:endParaRPr lang="en-CA"/>
           </a:p>
@@ -3433,53 +3438,6 @@
           </a:p>
         </p:txBody>
       </p:sp>
-      <p:pic>
-        <p:nvPicPr>
-          <p:cNvPr id="2050" name="Picture 2" descr="Jim Carrey on board for Dumb and Dumber sequel | Dumb and Dumber To | The  Guardian">
-            <a:extLst>
-              <a:ext uri="{FF2B5EF4-FFF2-40B4-BE49-F238E27FC236}">
-                <a16:creationId xmlns:a16="http://schemas.microsoft.com/office/drawing/2014/main" id="{A8F733C0-AB02-4EEE-8B55-7BE9A1CC93A4}"/>
-              </a:ext>
-            </a:extLst>
-          </p:cNvPr>
-          <p:cNvPicPr>
-            <a:picLocks noChangeAspect="1" noChangeArrowheads="1"/>
-          </p:cNvPicPr>
-          <p:nvPr/>
-        </p:nvPicPr>
-        <p:blipFill>
-          <a:blip r:embed="rId2">
-            <a:extLst>
-              <a:ext uri="{28A0092B-C50C-407E-A947-70E740481C1C}">
-                <a14:useLocalDpi xmlns:a14="http://schemas.microsoft.com/office/drawing/2010/main" val="0"/>
-              </a:ext>
-            </a:extLst>
-          </a:blip>
-          <a:srcRect/>
-          <a:stretch>
-            <a:fillRect/>
-          </a:stretch>
-        </p:blipFill>
-        <p:spPr bwMode="auto">
-          <a:xfrm>
-            <a:off x="0" y="4856480"/>
-            <a:ext cx="3335867" cy="2001520"/>
-          </a:xfrm>
-          <a:prstGeom prst="rect">
-            <a:avLst/>
-          </a:prstGeom>
-          <a:noFill/>
-          <a:extLst>
-            <a:ext uri="{909E8E84-426E-40DD-AFC4-6F175D3DCCD1}">
-              <a14:hiddenFill xmlns:a14="http://schemas.microsoft.com/office/drawing/2010/main">
-                <a:solidFill>
-                  <a:srgbClr val="FFFFFF"/>
-                </a:solidFill>
-              </a14:hiddenFill>
-            </a:ext>
-          </a:extLst>
-        </p:spPr>
-      </p:pic>
     </p:spTree>
     <p:extLst>
       <p:ext uri="{BB962C8B-B14F-4D97-AF65-F5344CB8AC3E}">
@@ -3562,47 +3520,13 @@
           <a:p>
             <a:r>
               <a:rPr lang="en-US" dirty="0"/>
-              <a:t>We will be attempting some remote labs – they will requires various tools to be installed on your computer.</a:t>
-            </a:r>
-          </a:p>
-          <a:p>
-            <a:pPr lvl="1"/>
+              <a:t>Labs were previously run on everyone's computers.</a:t>
+            </a:r>
+          </a:p>
+          <a:p>
             <a:r>
               <a:rPr lang="en-US" dirty="0"/>
-              <a:t>Linux, Mac, Windows </a:t>
-            </a:r>
-            <a:r>
-              <a:rPr lang="en-US" i="1" dirty="0"/>
-              <a:t>should </a:t>
-            </a:r>
-            <a:r>
-              <a:rPr lang="en-US" dirty="0"/>
-              <a:t>work here</a:t>
-            </a:r>
-            <a:r>
-              <a:rPr lang="en-US" i="1" dirty="0"/>
-              <a:t>.</a:t>
-            </a:r>
-          </a:p>
-          <a:p>
-            <a:pPr lvl="1"/>
-            <a:r>
-              <a:rPr lang="en-US" dirty="0"/>
-              <a:t>Labs will tie in with Assignments &amp; Course Lectures.</a:t>
-            </a:r>
-          </a:p>
-          <a:p>
-            <a:r>
-              <a:rPr lang="en-US" dirty="0"/>
-              <a:t>Labs are </a:t>
-            </a:r>
-            <a:r>
-              <a:rPr lang="en-US" i="1" dirty="0"/>
-              <a:t>planned</a:t>
-            </a:r>
-            <a:r>
-              <a:rPr lang="en-US" dirty="0"/>
-              <a:t> to be individual – I’m still discussing how we can keep the group feel alive, but so far it may be easier to run individually.</a:t>
+              <a:t>We may run them in the lab room.</a:t>
             </a:r>
             <a:endParaRPr lang="en-CA" dirty="0"/>
           </a:p>
@@ -3669,39 +3593,26 @@
                                   </p:childTnLst>
                                 </p:cTn>
                               </p:par>
+                            </p:childTnLst>
+                          </p:cTn>
+                        </p:par>
+                      </p:childTnLst>
+                    </p:cTn>
+                  </p:par>
+                  <p:par>
+                    <p:cTn id="7" fill="hold">
+                      <p:stCondLst>
+                        <p:cond delay="indefinite"/>
+                      </p:stCondLst>
+                      <p:childTnLst>
+                        <p:par>
+                          <p:cTn id="8" fill="hold">
+                            <p:stCondLst>
+                              <p:cond delay="0"/>
+                            </p:stCondLst>
+                            <p:childTnLst>
                               <p:par>
-                                <p:cTn id="7" presetID="1" presetClass="entr" presetSubtype="0" fill="hold" grpId="0" nodeType="withEffect">
-                                  <p:stCondLst>
-                                    <p:cond delay="0"/>
-                                  </p:stCondLst>
-                                  <p:childTnLst>
-                                    <p:set>
-                                      <p:cBhvr>
-                                        <p:cTn id="8" dur="1" fill="hold">
-                                          <p:stCondLst>
-                                            <p:cond delay="0"/>
-                                          </p:stCondLst>
-                                        </p:cTn>
-                                        <p:tgtEl>
-                                          <p:spTgt spid="3">
-                                            <p:txEl>
-                                              <p:pRg st="1" end="1"/>
-                                            </p:txEl>
-                                          </p:spTgt>
-                                        </p:tgtEl>
-                                        <p:attrNameLst>
-                                          <p:attrName>style.visibility</p:attrName>
-                                        </p:attrNameLst>
-                                      </p:cBhvr>
-                                      <p:to>
-                                        <p:strVal val="visible"/>
-                                      </p:to>
-                                    </p:set>
-                                  </p:childTnLst>
-                                </p:cTn>
-                              </p:par>
-                              <p:par>
-                                <p:cTn id="9" presetID="1" presetClass="entr" presetSubtype="0" fill="hold" grpId="0" nodeType="withEffect">
+                                <p:cTn id="9" presetID="1" presetClass="entr" presetSubtype="0" fill="hold" grpId="0" nodeType="clickEffect">
                                   <p:stCondLst>
                                     <p:cond delay="0"/>
                                   </p:stCondLst>
@@ -3716,56 +3627,7 @@
                                         <p:tgtEl>
                                           <p:spTgt spid="3">
                                             <p:txEl>
-                                              <p:pRg st="2" end="2"/>
-                                            </p:txEl>
-                                          </p:spTgt>
-                                        </p:tgtEl>
-                                        <p:attrNameLst>
-                                          <p:attrName>style.visibility</p:attrName>
-                                        </p:attrNameLst>
-                                      </p:cBhvr>
-                                      <p:to>
-                                        <p:strVal val="visible"/>
-                                      </p:to>
-                                    </p:set>
-                                  </p:childTnLst>
-                                </p:cTn>
-                              </p:par>
-                            </p:childTnLst>
-                          </p:cTn>
-                        </p:par>
-                      </p:childTnLst>
-                    </p:cTn>
-                  </p:par>
-                  <p:par>
-                    <p:cTn id="11" fill="hold">
-                      <p:stCondLst>
-                        <p:cond delay="indefinite"/>
-                      </p:stCondLst>
-                      <p:childTnLst>
-                        <p:par>
-                          <p:cTn id="12" fill="hold">
-                            <p:stCondLst>
-                              <p:cond delay="0"/>
-                            </p:stCondLst>
-                            <p:childTnLst>
-                              <p:par>
-                                <p:cTn id="13" presetID="1" presetClass="entr" presetSubtype="0" fill="hold" grpId="0" nodeType="clickEffect">
-                                  <p:stCondLst>
-                                    <p:cond delay="0"/>
-                                  </p:stCondLst>
-                                  <p:childTnLst>
-                                    <p:set>
-                                      <p:cBhvr>
-                                        <p:cTn id="14" dur="1" fill="hold">
-                                          <p:stCondLst>
-                                            <p:cond delay="0"/>
-                                          </p:stCondLst>
-                                        </p:cTn>
-                                        <p:tgtEl>
-                                          <p:spTgt spid="3">
-                                            <p:txEl>
-                                              <p:pRg st="3" end="3"/>
+                                              <p:pRg st="1" end="1"/>
                                             </p:txEl>
                                           </p:spTgt>
                                         </p:tgtEl>
@@ -3976,7 +3838,7 @@
           <a:p>
             <a:r>
               <a:rPr lang="en-US" dirty="0"/>
-              <a:t>There is a 24-hour final (would be ‘take home’, but in this case ‘stay home’) which involves both practical &amp; theoretical aspects.</a:t>
+              <a:t>Final includes two aspects: a lab test (practical) and a classic written test (during exam time).</a:t>
             </a:r>
           </a:p>
           <a:p>
@@ -5514,6 +5376,134 @@
           <p:cNvPr id="2" name="Title 1">
             <a:extLst>
               <a:ext uri="{FF2B5EF4-FFF2-40B4-BE49-F238E27FC236}">
+                <a16:creationId xmlns:a16="http://schemas.microsoft.com/office/drawing/2014/main" id="{C38C2DD5-3850-D69A-D95D-8FB4E256F259}"/>
+              </a:ext>
+            </a:extLst>
+          </p:cNvPr>
+          <p:cNvSpPr>
+            <a:spLocks noGrp="1"/>
+          </p:cNvSpPr>
+          <p:nvPr>
+            <p:ph type="title"/>
+          </p:nvPr>
+        </p:nvSpPr>
+        <p:spPr/>
+        <p:txBody>
+          <a:bodyPr/>
+          <a:lstStyle/>
+          <a:p>
+            <a:r>
+              <a:rPr lang="en-CA" dirty="0"/>
+              <a:t>Online to In Person</a:t>
+            </a:r>
+          </a:p>
+        </p:txBody>
+      </p:sp>
+      <p:sp>
+        <p:nvSpPr>
+          <p:cNvPr id="3" name="Content Placeholder 2">
+            <a:extLst>
+              <a:ext uri="{FF2B5EF4-FFF2-40B4-BE49-F238E27FC236}">
+                <a16:creationId xmlns:a16="http://schemas.microsoft.com/office/drawing/2014/main" id="{B2EB9948-0078-F848-0E56-D6EC1BE3348F}"/>
+              </a:ext>
+            </a:extLst>
+          </p:cNvPr>
+          <p:cNvSpPr>
+            <a:spLocks noGrp="1"/>
+          </p:cNvSpPr>
+          <p:nvPr>
+            <p:ph idx="1"/>
+          </p:nvPr>
+        </p:nvSpPr>
+        <p:spPr/>
+        <p:txBody>
+          <a:bodyPr/>
+          <a:lstStyle/>
+          <a:p>
+            <a:r>
+              <a:rPr lang="en-CA" dirty="0"/>
+              <a:t>I previously taught this course only online. This is the first </a:t>
+            </a:r>
+            <a:r>
+              <a:rPr lang="en-CA" u="sng" dirty="0"/>
+              <a:t>in-person</a:t>
+            </a:r>
+            <a:r>
+              <a:rPr lang="en-CA" dirty="0"/>
+              <a:t> edition.</a:t>
+            </a:r>
+          </a:p>
+          <a:p>
+            <a:r>
+              <a:rPr lang="en-CA" dirty="0"/>
+              <a:t>Previous lectures are available (from 2020 year) at </a:t>
+            </a:r>
+            <a:r>
+              <a:rPr lang="en-CA" dirty="0">
+                <a:hlinkClick r:id="rId2"/>
+              </a:rPr>
+              <a:t>https://www.youtube.com/playlist?list=PLyAXNQGte3qNNbs8J3gE8JkpAJ9_OH75q</a:t>
+            </a:r>
+            <a:r>
+              <a:rPr lang="en-CA" dirty="0"/>
+              <a:t> .</a:t>
+            </a:r>
+          </a:p>
+          <a:p>
+            <a:r>
+              <a:rPr lang="en-CA" dirty="0"/>
+              <a:t>Watch that some things (especially assignments/labs) may have changes this year.</a:t>
+            </a:r>
+          </a:p>
+          <a:p>
+            <a:r>
+              <a:rPr lang="en-CA" dirty="0"/>
+              <a:t>Where lectures differ, I’ll record versions and try to post them.</a:t>
+            </a:r>
+          </a:p>
+          <a:p>
+            <a:r>
+              <a:rPr lang="en-CA" dirty="0"/>
+              <a:t>“Lectures” were short – one class contains multiple lectures!</a:t>
+            </a:r>
+          </a:p>
+        </p:txBody>
+      </p:sp>
+    </p:spTree>
+    <p:extLst>
+      <p:ext uri="{BB962C8B-B14F-4D97-AF65-F5344CB8AC3E}">
+        <p14:creationId xmlns:p14="http://schemas.microsoft.com/office/powerpoint/2010/main" val="2482730179"/>
+      </p:ext>
+    </p:extLst>
+  </p:cSld>
+  <p:clrMapOvr>
+    <a:masterClrMapping/>
+  </p:clrMapOvr>
+</p:sld>
+</file>
+
+<file path=ppt/slides/slide6.xml><?xml version="1.0" encoding="utf-8"?>
+<p:sld xmlns:a="http://schemas.openxmlformats.org/drawingml/2006/main" xmlns:r="http://schemas.openxmlformats.org/officeDocument/2006/relationships" xmlns:p="http://schemas.openxmlformats.org/presentationml/2006/main">
+  <p:cSld>
+    <p:spTree>
+      <p:nvGrpSpPr>
+        <p:cNvPr id="1" name=""/>
+        <p:cNvGrpSpPr/>
+        <p:nvPr/>
+      </p:nvGrpSpPr>
+      <p:grpSpPr>
+        <a:xfrm>
+          <a:off x="0" y="0"/>
+          <a:ext cx="0" cy="0"/>
+          <a:chOff x="0" y="0"/>
+          <a:chExt cx="0" cy="0"/>
+        </a:xfrm>
+      </p:grpSpPr>
+      <p:sp>
+        <p:nvSpPr>
+          <p:cNvPr id="2" name="Title 1">
+            <a:extLst>
+              <a:ext uri="{FF2B5EF4-FFF2-40B4-BE49-F238E27FC236}">
                 <a16:creationId xmlns:a16="http://schemas.microsoft.com/office/drawing/2014/main" id="{505070EA-A2BA-4038-B982-862098C0430B}"/>
               </a:ext>
             </a:extLst>
@@ -5568,56 +5558,82 @@
           <a:p>
             <a:r>
               <a:rPr lang="en-US" dirty="0"/>
-              <a:t>Lectures are pre-recorded and posted onto Brightspace.</a:t>
-            </a:r>
-          </a:p>
-          <a:p>
-            <a:pPr lvl="1"/>
+              <a:t>Class schedule is roughly as follows each day:</a:t>
+            </a:r>
+          </a:p>
+          <a:p>
             <a:r>
               <a:rPr lang="en-US" dirty="0"/>
-              <a:t>I will likely mirror them somewhere public to make it easier to view mobile. Please check Brightspace for official links.</a:t>
+              <a:t>Monday @ 10:05AM – 11:25AM</a:t>
             </a:r>
           </a:p>
           <a:p>
             <a:r>
               <a:rPr lang="en-US" dirty="0"/>
-              <a:t>Tuesdays @ 1:05PM – 2:25PM we have a “lecture time” (this time here). This will be the chance to ask questions etc.</a:t>
-            </a:r>
-          </a:p>
-          <a:p>
+              <a:t>Thursdays @ 10:05AM – 11:25AM</a:t>
+            </a:r>
+          </a:p>
+          <a:p>
+            <a:pPr marL="0" indent="0">
+              <a:buNone/>
+            </a:pPr>
+            <a:endParaRPr lang="en-US" dirty="0"/>
+          </a:p>
+          <a:p>
+            <a:pPr marL="0" indent="0">
+              <a:buNone/>
+            </a:pPr>
             <a:r>
               <a:rPr lang="en-US" dirty="0"/>
-              <a:t>Thursdays @ 1:05PM – 2:25PM is “reserved course time”.</a:t>
-            </a:r>
-          </a:p>
-          <a:p>
-            <a:pPr lvl="1"/>
+              <a:t>Classes will </a:t>
+            </a:r>
+            <a:r>
+              <a:rPr lang="en-US" i="1" dirty="0"/>
+              <a:t>roughly</a:t>
+            </a:r>
             <a:r>
               <a:rPr lang="en-US" dirty="0"/>
-              <a:t>I will occasionally use this for special topics, additional explanations, etc.</a:t>
-            </a:r>
-          </a:p>
-          <a:p>
-            <a:pPr lvl="1"/>
+              <a:t> follow the schedule each day:</a:t>
+            </a:r>
+          </a:p>
+          <a:p>
+            <a:pPr marL="0" indent="0">
+              <a:buNone/>
+            </a:pPr>
+            <a:endParaRPr lang="en-US" dirty="0"/>
+          </a:p>
+          <a:p>
+            <a:pPr marL="0" indent="0">
+              <a:buNone/>
+            </a:pPr>
             <a:r>
               <a:rPr lang="en-US" dirty="0"/>
-              <a:t>Assume normally this time is reserved for you to watch course lectures so you can keep a regular schedule.</a:t>
-            </a:r>
-          </a:p>
-          <a:p>
+              <a:t>10:05-10:15: Recap of previous lecture (possibly longer if needed).</a:t>
+            </a:r>
+          </a:p>
+          <a:p>
+            <a:pPr marL="0" indent="0">
+              <a:buNone/>
+            </a:pPr>
             <a:r>
               <a:rPr lang="en-US" dirty="0"/>
-              <a:t>Each lecture is </a:t>
-            </a:r>
-            <a:r>
-              <a:rPr lang="en-US" u="sng" dirty="0"/>
-              <a:t>short</a:t>
-            </a:r>
+              <a:t>10:15-11:00: New material / lectures (45 mins)</a:t>
+            </a:r>
+          </a:p>
+          <a:p>
+            <a:pPr marL="0" indent="0">
+              <a:buNone/>
+            </a:pPr>
             <a:r>
               <a:rPr lang="en-US" dirty="0"/>
-              <a:t> (5-15 mins), thus one week will have multiple topics covered.</a:t>
-            </a:r>
-            <a:endParaRPr lang="en-CA" dirty="0"/>
+              <a:t>11:00-11:25: Questions &amp; discussions</a:t>
+            </a:r>
+          </a:p>
+          <a:p>
+            <a:pPr marL="0" indent="0">
+              <a:buNone/>
+            </a:pPr>
+            <a:endParaRPr lang="en-US" dirty="0"/>
           </a:p>
         </p:txBody>
       </p:sp>
@@ -5682,15 +5698,33 @@
                                   </p:childTnLst>
                                 </p:cTn>
                               </p:par>
+                            </p:childTnLst>
+                          </p:cTn>
+                        </p:par>
+                      </p:childTnLst>
+                    </p:cTn>
+                  </p:par>
+                  <p:par>
+                    <p:cTn id="7" fill="hold">
+                      <p:stCondLst>
+                        <p:cond delay="indefinite"/>
+                      </p:stCondLst>
+                      <p:childTnLst>
+                        <p:par>
+                          <p:cTn id="8" fill="hold">
+                            <p:stCondLst>
+                              <p:cond delay="0"/>
+                            </p:stCondLst>
+                            <p:childTnLst>
                               <p:par>
-                                <p:cTn id="7" presetID="1" presetClass="entr" presetSubtype="0" fill="hold" grpId="0" nodeType="withEffect">
+                                <p:cTn id="9" presetID="1" presetClass="entr" presetSubtype="0" fill="hold" grpId="0" nodeType="clickEffect">
                                   <p:stCondLst>
                                     <p:cond delay="0"/>
                                   </p:stCondLst>
                                   <p:childTnLst>
                                     <p:set>
                                       <p:cBhvr>
-                                        <p:cTn id="8" dur="1" fill="hold">
+                                        <p:cTn id="10" dur="1" fill="hold">
                                           <p:stCondLst>
                                             <p:cond delay="0"/>
                                           </p:stCondLst>
@@ -5720,26 +5754,26 @@
                     </p:cTn>
                   </p:par>
                   <p:par>
-                    <p:cTn id="9" fill="hold">
+                    <p:cTn id="11" fill="hold">
                       <p:stCondLst>
                         <p:cond delay="indefinite"/>
                       </p:stCondLst>
                       <p:childTnLst>
                         <p:par>
-                          <p:cTn id="10" fill="hold">
+                          <p:cTn id="12" fill="hold">
                             <p:stCondLst>
                               <p:cond delay="0"/>
                             </p:stCondLst>
                             <p:childTnLst>
                               <p:par>
-                                <p:cTn id="11" presetID="1" presetClass="entr" presetSubtype="0" fill="hold" grpId="0" nodeType="clickEffect">
+                                <p:cTn id="13" presetID="1" presetClass="entr" presetSubtype="0" fill="hold" grpId="0" nodeType="clickEffect">
                                   <p:stCondLst>
                                     <p:cond delay="0"/>
                                   </p:stCondLst>
                                   <p:childTnLst>
                                     <p:set>
                                       <p:cBhvr>
-                                        <p:cTn id="12" dur="1" fill="hold">
+                                        <p:cTn id="14" dur="1" fill="hold">
                                           <p:stCondLst>
                                             <p:cond delay="0"/>
                                           </p:stCondLst>
@@ -5769,50 +5803,19 @@
                     </p:cTn>
                   </p:par>
                   <p:par>
-                    <p:cTn id="13" fill="hold">
+                    <p:cTn id="15" fill="hold">
                       <p:stCondLst>
                         <p:cond delay="indefinite"/>
                       </p:stCondLst>
                       <p:childTnLst>
                         <p:par>
-                          <p:cTn id="14" fill="hold">
+                          <p:cTn id="16" fill="hold">
                             <p:stCondLst>
                               <p:cond delay="0"/>
                             </p:stCondLst>
                             <p:childTnLst>
                               <p:par>
-                                <p:cTn id="15" presetID="1" presetClass="entr" presetSubtype="0" fill="hold" grpId="0" nodeType="clickEffect">
-                                  <p:stCondLst>
-                                    <p:cond delay="0"/>
-                                  </p:stCondLst>
-                                  <p:childTnLst>
-                                    <p:set>
-                                      <p:cBhvr>
-                                        <p:cTn id="16" dur="1" fill="hold">
-                                          <p:stCondLst>
-                                            <p:cond delay="0"/>
-                                          </p:stCondLst>
-                                        </p:cTn>
-                                        <p:tgtEl>
-                                          <p:spTgt spid="3">
-                                            <p:txEl>
-                                              <p:pRg st="3" end="3"/>
-                                            </p:txEl>
-                                          </p:spTgt>
-                                        </p:tgtEl>
-                                        <p:attrNameLst>
-                                          <p:attrName>style.visibility</p:attrName>
-                                        </p:attrNameLst>
-                                      </p:cBhvr>
-                                      <p:to>
-                                        <p:strVal val="visible"/>
-                                      </p:to>
-                                    </p:set>
-                                  </p:childTnLst>
-                                </p:cTn>
-                              </p:par>
-                              <p:par>
-                                <p:cTn id="17" presetID="1" presetClass="entr" presetSubtype="0" fill="hold" grpId="0" nodeType="withEffect">
+                                <p:cTn id="17" presetID="1" presetClass="entr" presetSubtype="0" fill="hold" grpId="0" nodeType="clickEffect">
                                   <p:stCondLst>
                                     <p:cond delay="0"/>
                                   </p:stCondLst>
@@ -5842,15 +5845,33 @@
                                   </p:childTnLst>
                                 </p:cTn>
                               </p:par>
+                            </p:childTnLst>
+                          </p:cTn>
+                        </p:par>
+                      </p:childTnLst>
+                    </p:cTn>
+                  </p:par>
+                  <p:par>
+                    <p:cTn id="19" fill="hold">
+                      <p:stCondLst>
+                        <p:cond delay="indefinite"/>
+                      </p:stCondLst>
+                      <p:childTnLst>
+                        <p:par>
+                          <p:cTn id="20" fill="hold">
+                            <p:stCondLst>
+                              <p:cond delay="0"/>
+                            </p:stCondLst>
+                            <p:childTnLst>
                               <p:par>
-                                <p:cTn id="19" presetID="1" presetClass="entr" presetSubtype="0" fill="hold" grpId="0" nodeType="withEffect">
+                                <p:cTn id="21" presetID="1" presetClass="entr" presetSubtype="0" fill="hold" grpId="0" nodeType="clickEffect">
                                   <p:stCondLst>
                                     <p:cond delay="0"/>
                                   </p:stCondLst>
                                   <p:childTnLst>
                                     <p:set>
                                       <p:cBhvr>
-                                        <p:cTn id="20" dur="1" fill="hold">
+                                        <p:cTn id="22" dur="1" fill="hold">
                                           <p:stCondLst>
                                             <p:cond delay="0"/>
                                           </p:stCondLst>
@@ -5858,7 +5879,7 @@
                                         <p:tgtEl>
                                           <p:spTgt spid="3">
                                             <p:txEl>
-                                              <p:pRg st="5" end="5"/>
+                                              <p:pRg st="6" end="6"/>
                                             </p:txEl>
                                           </p:spTgt>
                                         </p:tgtEl>
@@ -5880,26 +5901,26 @@
                     </p:cTn>
                   </p:par>
                   <p:par>
-                    <p:cTn id="21" fill="hold">
+                    <p:cTn id="23" fill="hold">
                       <p:stCondLst>
                         <p:cond delay="indefinite"/>
                       </p:stCondLst>
                       <p:childTnLst>
                         <p:par>
-                          <p:cTn id="22" fill="hold">
+                          <p:cTn id="24" fill="hold">
                             <p:stCondLst>
                               <p:cond delay="0"/>
                             </p:stCondLst>
                             <p:childTnLst>
                               <p:par>
-                                <p:cTn id="23" presetID="1" presetClass="entr" presetSubtype="0" fill="hold" grpId="0" nodeType="clickEffect">
+                                <p:cTn id="25" presetID="1" presetClass="entr" presetSubtype="0" fill="hold" grpId="0" nodeType="clickEffect">
                                   <p:stCondLst>
                                     <p:cond delay="0"/>
                                   </p:stCondLst>
                                   <p:childTnLst>
                                     <p:set>
                                       <p:cBhvr>
-                                        <p:cTn id="24" dur="1" fill="hold">
+                                        <p:cTn id="26" dur="1" fill="hold">
                                           <p:stCondLst>
                                             <p:cond delay="0"/>
                                           </p:stCondLst>
@@ -5907,7 +5928,56 @@
                                         <p:tgtEl>
                                           <p:spTgt spid="3">
                                             <p:txEl>
-                                              <p:pRg st="6" end="6"/>
+                                              <p:pRg st="7" end="7"/>
+                                            </p:txEl>
+                                          </p:spTgt>
+                                        </p:tgtEl>
+                                        <p:attrNameLst>
+                                          <p:attrName>style.visibility</p:attrName>
+                                        </p:attrNameLst>
+                                      </p:cBhvr>
+                                      <p:to>
+                                        <p:strVal val="visible"/>
+                                      </p:to>
+                                    </p:set>
+                                  </p:childTnLst>
+                                </p:cTn>
+                              </p:par>
+                            </p:childTnLst>
+                          </p:cTn>
+                        </p:par>
+                      </p:childTnLst>
+                    </p:cTn>
+                  </p:par>
+                  <p:par>
+                    <p:cTn id="27" fill="hold">
+                      <p:stCondLst>
+                        <p:cond delay="indefinite"/>
+                      </p:stCondLst>
+                      <p:childTnLst>
+                        <p:par>
+                          <p:cTn id="28" fill="hold">
+                            <p:stCondLst>
+                              <p:cond delay="0"/>
+                            </p:stCondLst>
+                            <p:childTnLst>
+                              <p:par>
+                                <p:cTn id="29" presetID="1" presetClass="entr" presetSubtype="0" fill="hold" grpId="0" nodeType="clickEffect">
+                                  <p:stCondLst>
+                                    <p:cond delay="0"/>
+                                  </p:stCondLst>
+                                  <p:childTnLst>
+                                    <p:set>
+                                      <p:cBhvr>
+                                        <p:cTn id="30" dur="1" fill="hold">
+                                          <p:stCondLst>
+                                            <p:cond delay="0"/>
+                                          </p:stCondLst>
+                                        </p:cTn>
+                                        <p:tgtEl>
+                                          <p:spTgt spid="3">
+                                            <p:txEl>
+                                              <p:pRg st="8" end="8"/>
                                             </p:txEl>
                                           </p:spTgt>
                                         </p:tgtEl>
@@ -5956,97 +6026,6 @@
 </p:sld>
 </file>
 
-<file path=ppt/slides/slide6.xml><?xml version="1.0" encoding="utf-8"?>
-<p:sld xmlns:a="http://schemas.openxmlformats.org/drawingml/2006/main" xmlns:r="http://schemas.openxmlformats.org/officeDocument/2006/relationships" xmlns:p="http://schemas.openxmlformats.org/presentationml/2006/main">
-  <p:cSld>
-    <p:spTree>
-      <p:nvGrpSpPr>
-        <p:cNvPr id="1" name=""/>
-        <p:cNvGrpSpPr/>
-        <p:nvPr/>
-      </p:nvGrpSpPr>
-      <p:grpSpPr>
-        <a:xfrm>
-          <a:off x="0" y="0"/>
-          <a:ext cx="0" cy="0"/>
-          <a:chOff x="0" y="0"/>
-          <a:chExt cx="0" cy="0"/>
-        </a:xfrm>
-      </p:grpSpPr>
-      <p:sp>
-        <p:nvSpPr>
-          <p:cNvPr id="2" name="Title 1">
-            <a:extLst>
-              <a:ext uri="{FF2B5EF4-FFF2-40B4-BE49-F238E27FC236}">
-                <a16:creationId xmlns:a16="http://schemas.microsoft.com/office/drawing/2014/main" id="{BA3BF5BA-7F58-48B3-8296-858BB6B7ABEB}"/>
-              </a:ext>
-            </a:extLst>
-          </p:cNvPr>
-          <p:cNvSpPr>
-            <a:spLocks noGrp="1"/>
-          </p:cNvSpPr>
-          <p:nvPr>
-            <p:ph type="title"/>
-          </p:nvPr>
-        </p:nvSpPr>
-        <p:spPr/>
-        <p:txBody>
-          <a:bodyPr/>
-          <a:lstStyle/>
-          <a:p>
-            <a:r>
-              <a:rPr lang="en-US" dirty="0"/>
-              <a:t>Microsoft Teams Groups</a:t>
-            </a:r>
-            <a:endParaRPr lang="en-CA" dirty="0"/>
-          </a:p>
-        </p:txBody>
-      </p:sp>
-      <p:pic>
-        <p:nvPicPr>
-          <p:cNvPr id="4" name="Content Placeholder 3">
-            <a:extLst>
-              <a:ext uri="{FF2B5EF4-FFF2-40B4-BE49-F238E27FC236}">
-                <a16:creationId xmlns:a16="http://schemas.microsoft.com/office/drawing/2014/main" id="{A1A36EAE-9490-4619-884D-68657FC3F054}"/>
-              </a:ext>
-            </a:extLst>
-          </p:cNvPr>
-          <p:cNvPicPr>
-            <a:picLocks noGrp="1" noChangeAspect="1"/>
-          </p:cNvPicPr>
-          <p:nvPr>
-            <p:ph idx="1"/>
-          </p:nvPr>
-        </p:nvPicPr>
-        <p:blipFill>
-          <a:blip r:embed="rId2"/>
-          <a:stretch>
-            <a:fillRect/>
-          </a:stretch>
-        </p:blipFill>
-        <p:spPr>
-          <a:xfrm>
-            <a:off x="1484770" y="1825625"/>
-            <a:ext cx="9222460" cy="4351338"/>
-          </a:xfrm>
-          <a:prstGeom prst="rect">
-            <a:avLst/>
-          </a:prstGeom>
-        </p:spPr>
-      </p:pic>
-    </p:spTree>
-    <p:extLst>
-      <p:ext uri="{BB962C8B-B14F-4D97-AF65-F5344CB8AC3E}">
-        <p14:creationId xmlns:p14="http://schemas.microsoft.com/office/powerpoint/2010/main" val="2773962825"/>
-      </p:ext>
-    </p:extLst>
-  </p:cSld>
-  <p:clrMapOvr>
-    <a:masterClrMapping/>
-  </p:clrMapOvr>
-</p:sld>
-</file>
-
 <file path=ppt/slides/slide7.xml><?xml version="1.0" encoding="utf-8"?>
 <p:sld xmlns:a="http://schemas.openxmlformats.org/drawingml/2006/main" xmlns:r="http://schemas.openxmlformats.org/officeDocument/2006/relationships" xmlns:p="http://schemas.openxmlformats.org/presentationml/2006/main">
   <p:cSld>
@@ -6095,19 +6074,17 @@
       </p:sp>
       <p:pic>
         <p:nvPicPr>
-          <p:cNvPr id="4" name="Content Placeholder 3">
-            <a:extLst>
-              <a:ext uri="{FF2B5EF4-FFF2-40B4-BE49-F238E27FC236}">
-                <a16:creationId xmlns:a16="http://schemas.microsoft.com/office/drawing/2014/main" id="{746AB80D-3AD2-4782-8EF1-4CE33E1D6D9A}"/>
+          <p:cNvPr id="7" name="Picture 6">
+            <a:extLst>
+              <a:ext uri="{FF2B5EF4-FFF2-40B4-BE49-F238E27FC236}">
+                <a16:creationId xmlns:a16="http://schemas.microsoft.com/office/drawing/2014/main" id="{C056EBFD-C964-4448-AEA2-E7482709B7AB}"/>
               </a:ext>
             </a:extLst>
           </p:cNvPr>
           <p:cNvPicPr>
-            <a:picLocks noGrp="1" noChangeAspect="1"/>
+            <a:picLocks noChangeAspect="1"/>
           </p:cNvPicPr>
-          <p:nvPr>
-            <p:ph idx="1"/>
-          </p:nvPr>
+          <p:nvPr/>
         </p:nvPicPr>
         <p:blipFill>
           <a:blip r:embed="rId2"/>
@@ -6117,8 +6094,8 @@
         </p:blipFill>
         <p:spPr>
           <a:xfrm>
-            <a:off x="2761628" y="1825625"/>
-            <a:ext cx="6668744" cy="4351338"/>
+            <a:off x="2044373" y="1366564"/>
+            <a:ext cx="6981244" cy="5256940"/>
           </a:xfrm>
           <a:prstGeom prst="rect">
             <a:avLst/>
@@ -6207,7 +6184,7 @@
           <a:p>
             <a:r>
               <a:rPr lang="en-US" dirty="0"/>
-              <a:t>We will start quizzes next week – these cover some of the lecture topics.</a:t>
+              <a:t>We will start quizzes in 2 weeks (next week – no class) – these cover some of the lecture topics.</a:t>
             </a:r>
           </a:p>
           <a:p>
@@ -6316,7 +6293,7 @@
             <a:pPr lvl="1"/>
             <a:r>
               <a:rPr lang="en-US" dirty="0"/>
-              <a:t>Listed in the syllabus as “Weekly” – likely one every ~2-3 weeks in final version to avoid overloading you.</a:t>
+              <a:t>One every ~2-3 weeks in final version to avoid overloading you.</a:t>
             </a:r>
           </a:p>
         </p:txBody>

</xml_diff>